<commit_message>
update week_plan_kdh.pptx change name and update N2_Team_Schedule.xlsx -> N2_Team_Schedule_20161028.xlsx
</commit_message>
<xml_diff>
--- a/doc/_meeting_weekly_doc/week_plan_kdh.pptx
+++ b/doc/_meeting_weekly_doc/week_plan_kdh.pptx
@@ -6,6 +6,7 @@
   </p:sldMasterIdLst>
   <p:sldIdLst>
     <p:sldId id="257" r:id="rId2"/>
+    <p:sldId id="259" r:id="rId3"/>
   </p:sldIdLst>
   <p:sldSz cx="9144000" cy="6858000" type="screen4x3"/>
   <p:notesSz cx="6858000" cy="9144000"/>
@@ -5184,6 +5185,966 @@
 </p:sld>
 </file>
 
+<file path=ppt/slides/slide2.xml><?xml version="1.0" encoding="utf-8"?>
+<p:sld xmlns:a="http://schemas.openxmlformats.org/drawingml/2006/main" xmlns:r="http://schemas.openxmlformats.org/officeDocument/2006/relationships" xmlns:p="http://schemas.openxmlformats.org/presentationml/2006/main">
+  <p:cSld>
+    <p:spTree>
+      <p:nvGrpSpPr>
+        <p:cNvPr id="1" name=""/>
+        <p:cNvGrpSpPr/>
+        <p:nvPr/>
+      </p:nvGrpSpPr>
+      <p:grpSpPr>
+        <a:xfrm>
+          <a:off x="0" y="0"/>
+          <a:ext cx="0" cy="0"/>
+          <a:chOff x="0" y="0"/>
+          <a:chExt cx="0" cy="0"/>
+        </a:xfrm>
+      </p:grpSpPr>
+      <p:sp>
+        <p:nvSpPr>
+          <p:cNvPr id="2" name="제목 1"/>
+          <p:cNvSpPr>
+            <a:spLocks noGrp="1"/>
+          </p:cNvSpPr>
+          <p:nvPr>
+            <p:ph type="title"/>
+          </p:nvPr>
+        </p:nvSpPr>
+        <p:spPr/>
+        <p:txBody>
+          <a:bodyPr>
+            <a:normAutofit/>
+          </a:bodyPr>
+          <a:lstStyle/>
+          <a:p>
+            <a:r>
+              <a:rPr lang="en-US" altLang="ko-KR" sz="2000" dirty="0" smtClean="0"/>
+              <a:t>10/31 ~ 11/4 </a:t>
+            </a:r>
+            <a:r>
+              <a:rPr lang="ko-KR" altLang="en-US" sz="2000" dirty="0" smtClean="0"/>
+              <a:t>계획</a:t>
+            </a:r>
+            <a:endParaRPr lang="ko-KR" altLang="en-US" sz="2000" dirty="0"/>
+          </a:p>
+        </p:txBody>
+      </p:sp>
+      <p:graphicFrame>
+        <p:nvGraphicFramePr>
+          <p:cNvPr id="4" name="내용 개체 틀 3"/>
+          <p:cNvGraphicFramePr>
+            <a:graphicFrameLocks noGrp="1"/>
+          </p:cNvGraphicFramePr>
+          <p:nvPr>
+            <p:ph idx="1"/>
+          </p:nvPr>
+        </p:nvGraphicFramePr>
+        <p:xfrm>
+          <a:off x="467544" y="1268760"/>
+          <a:ext cx="8064896" cy="2595880"/>
+        </p:xfrm>
+        <a:graphic>
+          <a:graphicData uri="http://schemas.openxmlformats.org/drawingml/2006/table">
+            <a:tbl>
+              <a:tblPr firstRow="1" bandRow="1">
+                <a:tableStyleId>{5C22544A-7EE6-4342-B048-85BDC9FD1C3A}</a:tableStyleId>
+              </a:tblPr>
+              <a:tblGrid>
+                <a:gridCol w="1224136"/>
+                <a:gridCol w="6840760"/>
+              </a:tblGrid>
+              <a:tr h="370840">
+                <a:tc>
+                  <a:txBody>
+                    <a:bodyPr/>
+                    <a:lstStyle/>
+                    <a:p>
+                      <a:pPr algn="ctr" latinLnBrk="1"/>
+                      <a:endParaRPr lang="ko-KR" altLang="en-US" b="0" dirty="0">
+                        <a:solidFill>
+                          <a:schemeClr val="tx1"/>
+                        </a:solidFill>
+                        <a:latin typeface="+mn-lt"/>
+                      </a:endParaRPr>
+                    </a:p>
+                  </a:txBody>
+                  <a:tcPr>
+                    <a:lnL w="12700" cap="flat" cmpd="sng" algn="ctr">
+                      <a:solidFill>
+                        <a:schemeClr val="tx1"/>
+                      </a:solidFill>
+                      <a:prstDash val="solid"/>
+                      <a:round/>
+                      <a:headEnd type="none" w="med" len="med"/>
+                      <a:tailEnd type="none" w="med" len="med"/>
+                    </a:lnL>
+                    <a:lnR w="12700" cap="flat" cmpd="sng" algn="ctr">
+                      <a:solidFill>
+                        <a:schemeClr val="tx1"/>
+                      </a:solidFill>
+                      <a:prstDash val="solid"/>
+                      <a:round/>
+                      <a:headEnd type="none" w="med" len="med"/>
+                      <a:tailEnd type="none" w="med" len="med"/>
+                    </a:lnR>
+                    <a:lnT w="12700" cap="flat" cmpd="sng" algn="ctr">
+                      <a:solidFill>
+                        <a:schemeClr val="tx1"/>
+                      </a:solidFill>
+                      <a:prstDash val="solid"/>
+                      <a:round/>
+                      <a:headEnd type="none" w="med" len="med"/>
+                      <a:tailEnd type="none" w="med" len="med"/>
+                    </a:lnT>
+                    <a:lnB w="12700" cap="flat" cmpd="sng" algn="ctr">
+                      <a:solidFill>
+                        <a:schemeClr val="tx1"/>
+                      </a:solidFill>
+                      <a:prstDash val="solid"/>
+                      <a:round/>
+                      <a:headEnd type="none" w="med" len="med"/>
+                      <a:tailEnd type="none" w="med" len="med"/>
+                    </a:lnB>
+                    <a:noFill/>
+                  </a:tcPr>
+                </a:tc>
+                <a:tc>
+                  <a:txBody>
+                    <a:bodyPr/>
+                    <a:lstStyle/>
+                    <a:p>
+                      <a:pPr algn="ctr" latinLnBrk="1"/>
+                      <a:r>
+                        <a:rPr lang="ko-KR" altLang="en-US" b="0" dirty="0" smtClean="0">
+                          <a:solidFill>
+                            <a:schemeClr val="tx1"/>
+                          </a:solidFill>
+                          <a:latin typeface="+mn-lt"/>
+                        </a:rPr>
+                        <a:t>차주 계획</a:t>
+                      </a:r>
+                      <a:endParaRPr lang="ko-KR" altLang="en-US" b="0" dirty="0">
+                        <a:solidFill>
+                          <a:schemeClr val="tx1"/>
+                        </a:solidFill>
+                        <a:latin typeface="+mn-lt"/>
+                      </a:endParaRPr>
+                    </a:p>
+                  </a:txBody>
+                  <a:tcPr>
+                    <a:lnL w="12700" cap="flat" cmpd="sng" algn="ctr">
+                      <a:solidFill>
+                        <a:schemeClr val="tx1"/>
+                      </a:solidFill>
+                      <a:prstDash val="solid"/>
+                      <a:round/>
+                      <a:headEnd type="none" w="med" len="med"/>
+                      <a:tailEnd type="none" w="med" len="med"/>
+                    </a:lnL>
+                    <a:lnR w="12700" cap="flat" cmpd="sng" algn="ctr">
+                      <a:solidFill>
+                        <a:schemeClr val="tx1"/>
+                      </a:solidFill>
+                      <a:prstDash val="solid"/>
+                      <a:round/>
+                      <a:headEnd type="none" w="med" len="med"/>
+                      <a:tailEnd type="none" w="med" len="med"/>
+                    </a:lnR>
+                    <a:lnT w="12700" cap="flat" cmpd="sng" algn="ctr">
+                      <a:solidFill>
+                        <a:schemeClr val="tx1"/>
+                      </a:solidFill>
+                      <a:prstDash val="solid"/>
+                      <a:round/>
+                      <a:headEnd type="none" w="med" len="med"/>
+                      <a:tailEnd type="none" w="med" len="med"/>
+                    </a:lnT>
+                    <a:lnB w="12700" cap="flat" cmpd="sng" algn="ctr">
+                      <a:solidFill>
+                        <a:schemeClr val="tx1"/>
+                      </a:solidFill>
+                      <a:prstDash val="solid"/>
+                      <a:round/>
+                      <a:headEnd type="none" w="med" len="med"/>
+                      <a:tailEnd type="none" w="med" len="med"/>
+                    </a:lnB>
+                    <a:noFill/>
+                  </a:tcPr>
+                </a:tc>
+              </a:tr>
+              <a:tr h="370840">
+                <a:tc>
+                  <a:txBody>
+                    <a:bodyPr/>
+                    <a:lstStyle/>
+                    <a:p>
+                      <a:pPr algn="ctr" latinLnBrk="1"/>
+                      <a:r>
+                        <a:rPr lang="ko-KR" altLang="en-US" b="0" dirty="0" smtClean="0">
+                          <a:solidFill>
+                            <a:schemeClr val="tx1"/>
+                          </a:solidFill>
+                          <a:latin typeface="+mn-lt"/>
+                        </a:rPr>
+                        <a:t>엔진</a:t>
+                      </a:r>
+                      <a:endParaRPr lang="ko-KR" altLang="en-US" b="0" dirty="0">
+                        <a:solidFill>
+                          <a:schemeClr val="tx1"/>
+                        </a:solidFill>
+                        <a:latin typeface="+mn-lt"/>
+                      </a:endParaRPr>
+                    </a:p>
+                  </a:txBody>
+                  <a:tcPr>
+                    <a:lnL w="12700" cap="flat" cmpd="sng" algn="ctr">
+                      <a:solidFill>
+                        <a:schemeClr val="tx1"/>
+                      </a:solidFill>
+                      <a:prstDash val="solid"/>
+                      <a:round/>
+                      <a:headEnd type="none" w="med" len="med"/>
+                      <a:tailEnd type="none" w="med" len="med"/>
+                    </a:lnL>
+                    <a:lnR w="12700" cap="flat" cmpd="sng" algn="ctr">
+                      <a:solidFill>
+                        <a:schemeClr val="tx1"/>
+                      </a:solidFill>
+                      <a:prstDash val="solid"/>
+                      <a:round/>
+                      <a:headEnd type="none" w="med" len="med"/>
+                      <a:tailEnd type="none" w="med" len="med"/>
+                    </a:lnR>
+                    <a:lnT w="12700" cap="flat" cmpd="sng" algn="ctr">
+                      <a:solidFill>
+                        <a:schemeClr val="tx1"/>
+                      </a:solidFill>
+                      <a:prstDash val="solid"/>
+                      <a:round/>
+                      <a:headEnd type="none" w="med" len="med"/>
+                      <a:tailEnd type="none" w="med" len="med"/>
+                    </a:lnT>
+                    <a:lnB w="12700" cap="flat" cmpd="sng" algn="ctr">
+                      <a:solidFill>
+                        <a:schemeClr val="tx1"/>
+                      </a:solidFill>
+                      <a:prstDash val="solid"/>
+                      <a:round/>
+                      <a:headEnd type="none" w="med" len="med"/>
+                      <a:tailEnd type="none" w="med" len="med"/>
+                    </a:lnB>
+                    <a:noFill/>
+                  </a:tcPr>
+                </a:tc>
+                <a:tc>
+                  <a:txBody>
+                    <a:bodyPr/>
+                    <a:lstStyle/>
+                    <a:p>
+                      <a:pPr algn="ctr" latinLnBrk="1"/>
+                      <a:endParaRPr lang="ko-KR" altLang="en-US" b="0" dirty="0">
+                        <a:solidFill>
+                          <a:schemeClr val="tx1"/>
+                        </a:solidFill>
+                        <a:latin typeface="+mn-lt"/>
+                      </a:endParaRPr>
+                    </a:p>
+                  </a:txBody>
+                  <a:tcPr>
+                    <a:lnL w="12700" cap="flat" cmpd="sng" algn="ctr">
+                      <a:solidFill>
+                        <a:schemeClr val="tx1"/>
+                      </a:solidFill>
+                      <a:prstDash val="solid"/>
+                      <a:round/>
+                      <a:headEnd type="none" w="med" len="med"/>
+                      <a:tailEnd type="none" w="med" len="med"/>
+                    </a:lnL>
+                    <a:lnR w="12700" cap="flat" cmpd="sng" algn="ctr">
+                      <a:solidFill>
+                        <a:schemeClr val="tx1"/>
+                      </a:solidFill>
+                      <a:prstDash val="solid"/>
+                      <a:round/>
+                      <a:headEnd type="none" w="med" len="med"/>
+                      <a:tailEnd type="none" w="med" len="med"/>
+                    </a:lnR>
+                    <a:lnT w="12700" cap="flat" cmpd="sng" algn="ctr">
+                      <a:solidFill>
+                        <a:schemeClr val="tx1"/>
+                      </a:solidFill>
+                      <a:prstDash val="solid"/>
+                      <a:round/>
+                      <a:headEnd type="none" w="med" len="med"/>
+                      <a:tailEnd type="none" w="med" len="med"/>
+                    </a:lnT>
+                    <a:lnB w="12700" cap="flat" cmpd="sng" algn="ctr">
+                      <a:solidFill>
+                        <a:schemeClr val="tx1"/>
+                      </a:solidFill>
+                      <a:prstDash val="solid"/>
+                      <a:round/>
+                      <a:headEnd type="none" w="med" len="med"/>
+                      <a:tailEnd type="none" w="med" len="med"/>
+                    </a:lnB>
+                    <a:noFill/>
+                  </a:tcPr>
+                </a:tc>
+              </a:tr>
+              <a:tr h="370840">
+                <a:tc>
+                  <a:txBody>
+                    <a:bodyPr/>
+                    <a:lstStyle/>
+                    <a:p>
+                      <a:pPr algn="ctr" latinLnBrk="1"/>
+                      <a:r>
+                        <a:rPr lang="ko-KR" altLang="en-US" b="0" dirty="0" smtClean="0">
+                          <a:solidFill>
+                            <a:schemeClr val="tx1"/>
+                          </a:solidFill>
+                          <a:latin typeface="+mn-lt"/>
+                        </a:rPr>
+                        <a:t>캐릭터</a:t>
+                      </a:r>
+                      <a:endParaRPr lang="ko-KR" altLang="en-US" b="0" dirty="0">
+                        <a:solidFill>
+                          <a:schemeClr val="tx1"/>
+                        </a:solidFill>
+                        <a:latin typeface="+mn-lt"/>
+                      </a:endParaRPr>
+                    </a:p>
+                  </a:txBody>
+                  <a:tcPr>
+                    <a:lnL w="12700" cap="flat" cmpd="sng" algn="ctr">
+                      <a:solidFill>
+                        <a:schemeClr val="tx1"/>
+                      </a:solidFill>
+                      <a:prstDash val="solid"/>
+                      <a:round/>
+                      <a:headEnd type="none" w="med" len="med"/>
+                      <a:tailEnd type="none" w="med" len="med"/>
+                    </a:lnL>
+                    <a:lnR w="12700" cap="flat" cmpd="sng" algn="ctr">
+                      <a:solidFill>
+                        <a:schemeClr val="tx1"/>
+                      </a:solidFill>
+                      <a:prstDash val="solid"/>
+                      <a:round/>
+                      <a:headEnd type="none" w="med" len="med"/>
+                      <a:tailEnd type="none" w="med" len="med"/>
+                    </a:lnR>
+                    <a:lnT w="12700" cap="flat" cmpd="sng" algn="ctr">
+                      <a:solidFill>
+                        <a:schemeClr val="tx1"/>
+                      </a:solidFill>
+                      <a:prstDash val="solid"/>
+                      <a:round/>
+                      <a:headEnd type="none" w="med" len="med"/>
+                      <a:tailEnd type="none" w="med" len="med"/>
+                    </a:lnT>
+                    <a:lnB w="12700" cap="flat" cmpd="sng" algn="ctr">
+                      <a:solidFill>
+                        <a:schemeClr val="tx1"/>
+                      </a:solidFill>
+                      <a:prstDash val="solid"/>
+                      <a:round/>
+                      <a:headEnd type="none" w="med" len="med"/>
+                      <a:tailEnd type="none" w="med" len="med"/>
+                    </a:lnB>
+                    <a:noFill/>
+                  </a:tcPr>
+                </a:tc>
+                <a:tc>
+                  <a:txBody>
+                    <a:bodyPr/>
+                    <a:lstStyle/>
+                    <a:p>
+                      <a:pPr algn="ctr" latinLnBrk="1"/>
+                      <a:endParaRPr lang="ko-KR" altLang="en-US" b="0">
+                        <a:solidFill>
+                          <a:schemeClr val="tx1"/>
+                        </a:solidFill>
+                        <a:latin typeface="+mn-lt"/>
+                      </a:endParaRPr>
+                    </a:p>
+                  </a:txBody>
+                  <a:tcPr>
+                    <a:lnL w="12700" cap="flat" cmpd="sng" algn="ctr">
+                      <a:solidFill>
+                        <a:schemeClr val="tx1"/>
+                      </a:solidFill>
+                      <a:prstDash val="solid"/>
+                      <a:round/>
+                      <a:headEnd type="none" w="med" len="med"/>
+                      <a:tailEnd type="none" w="med" len="med"/>
+                    </a:lnL>
+                    <a:lnR w="12700" cap="flat" cmpd="sng" algn="ctr">
+                      <a:solidFill>
+                        <a:schemeClr val="tx1"/>
+                      </a:solidFill>
+                      <a:prstDash val="solid"/>
+                      <a:round/>
+                      <a:headEnd type="none" w="med" len="med"/>
+                      <a:tailEnd type="none" w="med" len="med"/>
+                    </a:lnR>
+                    <a:lnT w="12700" cap="flat" cmpd="sng" algn="ctr">
+                      <a:solidFill>
+                        <a:schemeClr val="tx1"/>
+                      </a:solidFill>
+                      <a:prstDash val="solid"/>
+                      <a:round/>
+                      <a:headEnd type="none" w="med" len="med"/>
+                      <a:tailEnd type="none" w="med" len="med"/>
+                    </a:lnT>
+                    <a:lnB w="12700" cap="flat" cmpd="sng" algn="ctr">
+                      <a:solidFill>
+                        <a:schemeClr val="tx1"/>
+                      </a:solidFill>
+                      <a:prstDash val="solid"/>
+                      <a:round/>
+                      <a:headEnd type="none" w="med" len="med"/>
+                      <a:tailEnd type="none" w="med" len="med"/>
+                    </a:lnB>
+                    <a:noFill/>
+                  </a:tcPr>
+                </a:tc>
+              </a:tr>
+              <a:tr h="370840">
+                <a:tc>
+                  <a:txBody>
+                    <a:bodyPr/>
+                    <a:lstStyle/>
+                    <a:p>
+                      <a:pPr algn="ctr" latinLnBrk="1"/>
+                      <a:r>
+                        <a:rPr lang="ko-KR" altLang="en-US" b="0" dirty="0" err="1" smtClean="0">
+                          <a:solidFill>
+                            <a:schemeClr val="tx1"/>
+                          </a:solidFill>
+                          <a:latin typeface="+mn-lt"/>
+                        </a:rPr>
+                        <a:t>맵</a:t>
+                      </a:r>
+                      <a:endParaRPr lang="ko-KR" altLang="en-US" b="0" dirty="0">
+                        <a:solidFill>
+                          <a:schemeClr val="tx1"/>
+                        </a:solidFill>
+                        <a:latin typeface="+mn-lt"/>
+                      </a:endParaRPr>
+                    </a:p>
+                  </a:txBody>
+                  <a:tcPr>
+                    <a:lnL w="12700" cap="flat" cmpd="sng" algn="ctr">
+                      <a:solidFill>
+                        <a:schemeClr val="tx1"/>
+                      </a:solidFill>
+                      <a:prstDash val="solid"/>
+                      <a:round/>
+                      <a:headEnd type="none" w="med" len="med"/>
+                      <a:tailEnd type="none" w="med" len="med"/>
+                    </a:lnL>
+                    <a:lnR w="12700" cap="flat" cmpd="sng" algn="ctr">
+                      <a:solidFill>
+                        <a:schemeClr val="tx1"/>
+                      </a:solidFill>
+                      <a:prstDash val="solid"/>
+                      <a:round/>
+                      <a:headEnd type="none" w="med" len="med"/>
+                      <a:tailEnd type="none" w="med" len="med"/>
+                    </a:lnR>
+                    <a:lnT w="12700" cap="flat" cmpd="sng" algn="ctr">
+                      <a:solidFill>
+                        <a:schemeClr val="tx1"/>
+                      </a:solidFill>
+                      <a:prstDash val="solid"/>
+                      <a:round/>
+                      <a:headEnd type="none" w="med" len="med"/>
+                      <a:tailEnd type="none" w="med" len="med"/>
+                    </a:lnT>
+                    <a:lnB w="12700" cap="flat" cmpd="sng" algn="ctr">
+                      <a:solidFill>
+                        <a:schemeClr val="tx1"/>
+                      </a:solidFill>
+                      <a:prstDash val="solid"/>
+                      <a:round/>
+                      <a:headEnd type="none" w="med" len="med"/>
+                      <a:tailEnd type="none" w="med" len="med"/>
+                    </a:lnB>
+                    <a:noFill/>
+                  </a:tcPr>
+                </a:tc>
+                <a:tc>
+                  <a:txBody>
+                    <a:bodyPr/>
+                    <a:lstStyle/>
+                    <a:p>
+                      <a:pPr algn="ctr" latinLnBrk="1"/>
+                      <a:endParaRPr lang="ko-KR" altLang="en-US" b="0" dirty="0">
+                        <a:solidFill>
+                          <a:schemeClr val="tx1"/>
+                        </a:solidFill>
+                        <a:latin typeface="+mn-lt"/>
+                      </a:endParaRPr>
+                    </a:p>
+                  </a:txBody>
+                  <a:tcPr>
+                    <a:lnL w="12700" cap="flat" cmpd="sng" algn="ctr">
+                      <a:solidFill>
+                        <a:schemeClr val="tx1"/>
+                      </a:solidFill>
+                      <a:prstDash val="solid"/>
+                      <a:round/>
+                      <a:headEnd type="none" w="med" len="med"/>
+                      <a:tailEnd type="none" w="med" len="med"/>
+                    </a:lnL>
+                    <a:lnR w="12700" cap="flat" cmpd="sng" algn="ctr">
+                      <a:solidFill>
+                        <a:schemeClr val="tx1"/>
+                      </a:solidFill>
+                      <a:prstDash val="solid"/>
+                      <a:round/>
+                      <a:headEnd type="none" w="med" len="med"/>
+                      <a:tailEnd type="none" w="med" len="med"/>
+                    </a:lnR>
+                    <a:lnT w="12700" cap="flat" cmpd="sng" algn="ctr">
+                      <a:solidFill>
+                        <a:schemeClr val="tx1"/>
+                      </a:solidFill>
+                      <a:prstDash val="solid"/>
+                      <a:round/>
+                      <a:headEnd type="none" w="med" len="med"/>
+                      <a:tailEnd type="none" w="med" len="med"/>
+                    </a:lnT>
+                    <a:lnB w="12700" cap="flat" cmpd="sng" algn="ctr">
+                      <a:solidFill>
+                        <a:schemeClr val="tx1"/>
+                      </a:solidFill>
+                      <a:prstDash val="solid"/>
+                      <a:round/>
+                      <a:headEnd type="none" w="med" len="med"/>
+                      <a:tailEnd type="none" w="med" len="med"/>
+                    </a:lnB>
+                    <a:noFill/>
+                  </a:tcPr>
+                </a:tc>
+              </a:tr>
+              <a:tr h="370840">
+                <a:tc>
+                  <a:txBody>
+                    <a:bodyPr/>
+                    <a:lstStyle/>
+                    <a:p>
+                      <a:pPr algn="ctr" latinLnBrk="1"/>
+                      <a:r>
+                        <a:rPr lang="en-US" altLang="ko-KR" b="0" dirty="0" smtClean="0">
+                          <a:solidFill>
+                            <a:schemeClr val="tx1"/>
+                          </a:solidFill>
+                          <a:latin typeface="+mn-lt"/>
+                        </a:rPr>
+                        <a:t>UI</a:t>
+                      </a:r>
+                      <a:endParaRPr lang="ko-KR" altLang="en-US" b="0" dirty="0">
+                        <a:solidFill>
+                          <a:schemeClr val="tx1"/>
+                        </a:solidFill>
+                        <a:latin typeface="+mn-lt"/>
+                      </a:endParaRPr>
+                    </a:p>
+                  </a:txBody>
+                  <a:tcPr>
+                    <a:lnL w="12700" cap="flat" cmpd="sng" algn="ctr">
+                      <a:solidFill>
+                        <a:schemeClr val="tx1"/>
+                      </a:solidFill>
+                      <a:prstDash val="solid"/>
+                      <a:round/>
+                      <a:headEnd type="none" w="med" len="med"/>
+                      <a:tailEnd type="none" w="med" len="med"/>
+                    </a:lnL>
+                    <a:lnR w="12700" cap="flat" cmpd="sng" algn="ctr">
+                      <a:solidFill>
+                        <a:schemeClr val="tx1"/>
+                      </a:solidFill>
+                      <a:prstDash val="solid"/>
+                      <a:round/>
+                      <a:headEnd type="none" w="med" len="med"/>
+                      <a:tailEnd type="none" w="med" len="med"/>
+                    </a:lnR>
+                    <a:lnT w="12700" cap="flat" cmpd="sng" algn="ctr">
+                      <a:solidFill>
+                        <a:schemeClr val="tx1"/>
+                      </a:solidFill>
+                      <a:prstDash val="solid"/>
+                      <a:round/>
+                      <a:headEnd type="none" w="med" len="med"/>
+                      <a:tailEnd type="none" w="med" len="med"/>
+                    </a:lnT>
+                    <a:lnB w="12700" cap="flat" cmpd="sng" algn="ctr">
+                      <a:solidFill>
+                        <a:schemeClr val="tx1"/>
+                      </a:solidFill>
+                      <a:prstDash val="solid"/>
+                      <a:round/>
+                      <a:headEnd type="none" w="med" len="med"/>
+                      <a:tailEnd type="none" w="med" len="med"/>
+                    </a:lnB>
+                    <a:noFill/>
+                  </a:tcPr>
+                </a:tc>
+                <a:tc>
+                  <a:txBody>
+                    <a:bodyPr/>
+                    <a:lstStyle/>
+                    <a:p>
+                      <a:pPr algn="ctr" latinLnBrk="1"/>
+                      <a:endParaRPr lang="ko-KR" altLang="en-US" b="0" dirty="0">
+                        <a:solidFill>
+                          <a:schemeClr val="tx1"/>
+                        </a:solidFill>
+                        <a:latin typeface="+mn-lt"/>
+                      </a:endParaRPr>
+                    </a:p>
+                  </a:txBody>
+                  <a:tcPr>
+                    <a:lnL w="12700" cap="flat" cmpd="sng" algn="ctr">
+                      <a:solidFill>
+                        <a:schemeClr val="tx1"/>
+                      </a:solidFill>
+                      <a:prstDash val="solid"/>
+                      <a:round/>
+                      <a:headEnd type="none" w="med" len="med"/>
+                      <a:tailEnd type="none" w="med" len="med"/>
+                    </a:lnL>
+                    <a:lnR w="12700" cap="flat" cmpd="sng" algn="ctr">
+                      <a:solidFill>
+                        <a:schemeClr val="tx1"/>
+                      </a:solidFill>
+                      <a:prstDash val="solid"/>
+                      <a:round/>
+                      <a:headEnd type="none" w="med" len="med"/>
+                      <a:tailEnd type="none" w="med" len="med"/>
+                    </a:lnR>
+                    <a:lnT w="12700" cap="flat" cmpd="sng" algn="ctr">
+                      <a:solidFill>
+                        <a:schemeClr val="tx1"/>
+                      </a:solidFill>
+                      <a:prstDash val="solid"/>
+                      <a:round/>
+                      <a:headEnd type="none" w="med" len="med"/>
+                      <a:tailEnd type="none" w="med" len="med"/>
+                    </a:lnT>
+                    <a:lnB w="12700" cap="flat" cmpd="sng" algn="ctr">
+                      <a:solidFill>
+                        <a:schemeClr val="tx1"/>
+                      </a:solidFill>
+                      <a:prstDash val="solid"/>
+                      <a:round/>
+                      <a:headEnd type="none" w="med" len="med"/>
+                      <a:tailEnd type="none" w="med" len="med"/>
+                    </a:lnB>
+                    <a:noFill/>
+                  </a:tcPr>
+                </a:tc>
+              </a:tr>
+              <a:tr h="370840">
+                <a:tc>
+                  <a:txBody>
+                    <a:bodyPr/>
+                    <a:lstStyle/>
+                    <a:p>
+                      <a:pPr algn="ctr" latinLnBrk="1"/>
+                      <a:r>
+                        <a:rPr lang="ko-KR" altLang="en-US" b="0" dirty="0" err="1" smtClean="0">
+                          <a:solidFill>
+                            <a:schemeClr val="tx1"/>
+                          </a:solidFill>
+                          <a:latin typeface="+mn-lt"/>
+                        </a:rPr>
+                        <a:t>이펙트</a:t>
+                      </a:r>
+                      <a:endParaRPr lang="ko-KR" altLang="en-US" b="0" dirty="0">
+                        <a:solidFill>
+                          <a:schemeClr val="tx1"/>
+                        </a:solidFill>
+                        <a:latin typeface="+mn-lt"/>
+                      </a:endParaRPr>
+                    </a:p>
+                  </a:txBody>
+                  <a:tcPr>
+                    <a:lnL w="12700" cap="flat" cmpd="sng" algn="ctr">
+                      <a:solidFill>
+                        <a:schemeClr val="tx1"/>
+                      </a:solidFill>
+                      <a:prstDash val="solid"/>
+                      <a:round/>
+                      <a:headEnd type="none" w="med" len="med"/>
+                      <a:tailEnd type="none" w="med" len="med"/>
+                    </a:lnL>
+                    <a:lnR w="12700" cap="flat" cmpd="sng" algn="ctr">
+                      <a:solidFill>
+                        <a:schemeClr val="tx1"/>
+                      </a:solidFill>
+                      <a:prstDash val="solid"/>
+                      <a:round/>
+                      <a:headEnd type="none" w="med" len="med"/>
+                      <a:tailEnd type="none" w="med" len="med"/>
+                    </a:lnR>
+                    <a:lnT w="12700" cap="flat" cmpd="sng" algn="ctr">
+                      <a:solidFill>
+                        <a:schemeClr val="tx1"/>
+                      </a:solidFill>
+                      <a:prstDash val="solid"/>
+                      <a:round/>
+                      <a:headEnd type="none" w="med" len="med"/>
+                      <a:tailEnd type="none" w="med" len="med"/>
+                    </a:lnT>
+                    <a:lnB w="12700" cap="flat" cmpd="sng" algn="ctr">
+                      <a:solidFill>
+                        <a:schemeClr val="tx1"/>
+                      </a:solidFill>
+                      <a:prstDash val="solid"/>
+                      <a:round/>
+                      <a:headEnd type="none" w="med" len="med"/>
+                      <a:tailEnd type="none" w="med" len="med"/>
+                    </a:lnB>
+                    <a:noFill/>
+                  </a:tcPr>
+                </a:tc>
+                <a:tc>
+                  <a:txBody>
+                    <a:bodyPr/>
+                    <a:lstStyle/>
+                    <a:p>
+                      <a:pPr algn="ctr" latinLnBrk="1"/>
+                      <a:r>
+                        <a:rPr lang="ko-KR" altLang="en-US" b="0" dirty="0" smtClean="0">
+                          <a:solidFill>
+                            <a:schemeClr val="tx1"/>
+                          </a:solidFill>
+                          <a:latin typeface="+mn-lt"/>
+                        </a:rPr>
+                        <a:t>툴 </a:t>
+                      </a:r>
+                      <a:r>
+                        <a:rPr lang="en-US" altLang="ko-KR" b="0" dirty="0" smtClean="0">
+                          <a:solidFill>
+                            <a:schemeClr val="tx1"/>
+                          </a:solidFill>
+                          <a:latin typeface="+mn-lt"/>
+                        </a:rPr>
+                        <a:t>position, bounding box </a:t>
+                      </a:r>
+                      <a:r>
+                        <a:rPr lang="ko-KR" altLang="en-US" b="0" dirty="0" smtClean="0">
+                          <a:solidFill>
+                            <a:schemeClr val="tx1"/>
+                          </a:solidFill>
+                          <a:latin typeface="+mn-lt"/>
+                        </a:rPr>
+                        <a:t>추가 등 </a:t>
+                      </a:r>
+                      <a:r>
+                        <a:rPr lang="ko-KR" altLang="en-US" b="0" dirty="0" err="1" smtClean="0">
+                          <a:solidFill>
+                            <a:schemeClr val="tx1"/>
+                          </a:solidFill>
+                          <a:latin typeface="+mn-lt"/>
+                        </a:rPr>
+                        <a:t>이펙트</a:t>
+                      </a:r>
+                      <a:r>
+                        <a:rPr lang="ko-KR" altLang="en-US" b="0" dirty="0" smtClean="0">
+                          <a:solidFill>
+                            <a:schemeClr val="tx1"/>
+                          </a:solidFill>
+                          <a:latin typeface="+mn-lt"/>
+                        </a:rPr>
+                        <a:t> 툴 제작 마무리</a:t>
+                      </a:r>
+                      <a:endParaRPr lang="ko-KR" altLang="en-US" b="0" dirty="0">
+                        <a:solidFill>
+                          <a:schemeClr val="tx1"/>
+                        </a:solidFill>
+                        <a:latin typeface="+mn-lt"/>
+                      </a:endParaRPr>
+                    </a:p>
+                  </a:txBody>
+                  <a:tcPr>
+                    <a:lnL w="12700" cap="flat" cmpd="sng" algn="ctr">
+                      <a:solidFill>
+                        <a:schemeClr val="tx1"/>
+                      </a:solidFill>
+                      <a:prstDash val="solid"/>
+                      <a:round/>
+                      <a:headEnd type="none" w="med" len="med"/>
+                      <a:tailEnd type="none" w="med" len="med"/>
+                    </a:lnL>
+                    <a:lnR w="12700" cap="flat" cmpd="sng" algn="ctr">
+                      <a:solidFill>
+                        <a:schemeClr val="tx1"/>
+                      </a:solidFill>
+                      <a:prstDash val="solid"/>
+                      <a:round/>
+                      <a:headEnd type="none" w="med" len="med"/>
+                      <a:tailEnd type="none" w="med" len="med"/>
+                    </a:lnR>
+                    <a:lnT w="12700" cap="flat" cmpd="sng" algn="ctr">
+                      <a:solidFill>
+                        <a:schemeClr val="tx1"/>
+                      </a:solidFill>
+                      <a:prstDash val="solid"/>
+                      <a:round/>
+                      <a:headEnd type="none" w="med" len="med"/>
+                      <a:tailEnd type="none" w="med" len="med"/>
+                    </a:lnT>
+                    <a:lnB w="12700" cap="flat" cmpd="sng" algn="ctr">
+                      <a:solidFill>
+                        <a:schemeClr val="tx1"/>
+                      </a:solidFill>
+                      <a:prstDash val="solid"/>
+                      <a:round/>
+                      <a:headEnd type="none" w="med" len="med"/>
+                      <a:tailEnd type="none" w="med" len="med"/>
+                    </a:lnB>
+                    <a:noFill/>
+                  </a:tcPr>
+                </a:tc>
+              </a:tr>
+              <a:tr h="370840">
+                <a:tc>
+                  <a:txBody>
+                    <a:bodyPr/>
+                    <a:lstStyle/>
+                    <a:p>
+                      <a:pPr algn="ctr" latinLnBrk="1"/>
+                      <a:r>
+                        <a:rPr lang="en-US" altLang="ko-KR" b="0" dirty="0" smtClean="0">
+                          <a:solidFill>
+                            <a:schemeClr val="tx1"/>
+                          </a:solidFill>
+                          <a:latin typeface="+mn-lt"/>
+                        </a:rPr>
+                        <a:t>AI</a:t>
+                      </a:r>
+                      <a:endParaRPr lang="ko-KR" altLang="en-US" b="0" dirty="0">
+                        <a:solidFill>
+                          <a:schemeClr val="tx1"/>
+                        </a:solidFill>
+                        <a:latin typeface="+mn-lt"/>
+                      </a:endParaRPr>
+                    </a:p>
+                  </a:txBody>
+                  <a:tcPr>
+                    <a:lnL w="12700" cap="flat" cmpd="sng" algn="ctr">
+                      <a:solidFill>
+                        <a:schemeClr val="tx1"/>
+                      </a:solidFill>
+                      <a:prstDash val="solid"/>
+                      <a:round/>
+                      <a:headEnd type="none" w="med" len="med"/>
+                      <a:tailEnd type="none" w="med" len="med"/>
+                    </a:lnL>
+                    <a:lnR w="12700" cap="flat" cmpd="sng" algn="ctr">
+                      <a:solidFill>
+                        <a:schemeClr val="tx1"/>
+                      </a:solidFill>
+                      <a:prstDash val="solid"/>
+                      <a:round/>
+                      <a:headEnd type="none" w="med" len="med"/>
+                      <a:tailEnd type="none" w="med" len="med"/>
+                    </a:lnR>
+                    <a:lnT w="12700" cap="flat" cmpd="sng" algn="ctr">
+                      <a:solidFill>
+                        <a:schemeClr val="tx1"/>
+                      </a:solidFill>
+                      <a:prstDash val="solid"/>
+                      <a:round/>
+                      <a:headEnd type="none" w="med" len="med"/>
+                      <a:tailEnd type="none" w="med" len="med"/>
+                    </a:lnT>
+                    <a:lnB w="12700" cap="flat" cmpd="sng" algn="ctr">
+                      <a:solidFill>
+                        <a:schemeClr val="tx1"/>
+                      </a:solidFill>
+                      <a:prstDash val="solid"/>
+                      <a:round/>
+                      <a:headEnd type="none" w="med" len="med"/>
+                      <a:tailEnd type="none" w="med" len="med"/>
+                    </a:lnB>
+                    <a:noFill/>
+                  </a:tcPr>
+                </a:tc>
+                <a:tc>
+                  <a:txBody>
+                    <a:bodyPr/>
+                    <a:lstStyle/>
+                    <a:p>
+                      <a:pPr algn="ctr" latinLnBrk="1"/>
+                      <a:endParaRPr lang="ko-KR" altLang="en-US" b="0" dirty="0">
+                        <a:solidFill>
+                          <a:schemeClr val="tx1"/>
+                        </a:solidFill>
+                        <a:latin typeface="+mn-lt"/>
+                      </a:endParaRPr>
+                    </a:p>
+                  </a:txBody>
+                  <a:tcPr>
+                    <a:lnL w="12700" cap="flat" cmpd="sng" algn="ctr">
+                      <a:solidFill>
+                        <a:schemeClr val="tx1"/>
+                      </a:solidFill>
+                      <a:prstDash val="solid"/>
+                      <a:round/>
+                      <a:headEnd type="none" w="med" len="med"/>
+                      <a:tailEnd type="none" w="med" len="med"/>
+                    </a:lnL>
+                    <a:lnR w="12700" cap="flat" cmpd="sng" algn="ctr">
+                      <a:solidFill>
+                        <a:schemeClr val="tx1"/>
+                      </a:solidFill>
+                      <a:prstDash val="solid"/>
+                      <a:round/>
+                      <a:headEnd type="none" w="med" len="med"/>
+                      <a:tailEnd type="none" w="med" len="med"/>
+                    </a:lnR>
+                    <a:lnT w="12700" cap="flat" cmpd="sng" algn="ctr">
+                      <a:solidFill>
+                        <a:schemeClr val="tx1"/>
+                      </a:solidFill>
+                      <a:prstDash val="solid"/>
+                      <a:round/>
+                      <a:headEnd type="none" w="med" len="med"/>
+                      <a:tailEnd type="none" w="med" len="med"/>
+                    </a:lnT>
+                    <a:lnB w="12700" cap="flat" cmpd="sng" algn="ctr">
+                      <a:solidFill>
+                        <a:schemeClr val="tx1"/>
+                      </a:solidFill>
+                      <a:prstDash val="solid"/>
+                      <a:round/>
+                      <a:headEnd type="none" w="med" len="med"/>
+                      <a:tailEnd type="none" w="med" len="med"/>
+                    </a:lnB>
+                    <a:noFill/>
+                  </a:tcPr>
+                </a:tc>
+              </a:tr>
+            </a:tbl>
+          </a:graphicData>
+        </a:graphic>
+      </p:graphicFrame>
+    </p:spTree>
+  </p:cSld>
+  <p:clrMapOvr>
+    <a:masterClrMapping/>
+  </p:clrMapOvr>
+</p:sld>
+</file>
+
 <file path=ppt/theme/theme1.xml><?xml version="1.0" encoding="utf-8"?>
 <a:theme xmlns:a="http://schemas.openxmlformats.org/drawingml/2006/main" name="Office 테마">
   <a:themeElements>

</xml_diff>